<commit_message>
fixed write to manipulation top register connected manipulation trigger to bank switch changed addr_calc.vhd to support large resolution - no warning now
</commit_message>
<xml_diff>
--- a/Presentation/Img Man Top FSM.pptx
+++ b/Presentation/Img Man Top FSM.pptx
@@ -289,7 +289,7 @@
           <a:p>
             <a:fld id="{D1329CB7-D74C-47FA-A22A-C6A2E8AA6A2B}" type="datetimeFigureOut">
               <a:rPr lang="he-IL" smtClean="0"/>
-              <a:t>ט"ז/ניסן/תשע"ג</a:t>
+              <a:t>כ"ד/אייר/תשע"ג</a:t>
             </a:fld>
             <a:endParaRPr lang="he-IL"/>
           </a:p>
@@ -459,7 +459,7 @@
           <a:p>
             <a:fld id="{D1329CB7-D74C-47FA-A22A-C6A2E8AA6A2B}" type="datetimeFigureOut">
               <a:rPr lang="he-IL" smtClean="0"/>
-              <a:t>ט"ז/ניסן/תשע"ג</a:t>
+              <a:t>כ"ד/אייר/תשע"ג</a:t>
             </a:fld>
             <a:endParaRPr lang="he-IL"/>
           </a:p>
@@ -639,7 +639,7 @@
           <a:p>
             <a:fld id="{D1329CB7-D74C-47FA-A22A-C6A2E8AA6A2B}" type="datetimeFigureOut">
               <a:rPr lang="he-IL" smtClean="0"/>
-              <a:t>ט"ז/ניסן/תשע"ג</a:t>
+              <a:t>כ"ד/אייר/תשע"ג</a:t>
             </a:fld>
             <a:endParaRPr lang="he-IL"/>
           </a:p>
@@ -809,7 +809,7 @@
           <a:p>
             <a:fld id="{D1329CB7-D74C-47FA-A22A-C6A2E8AA6A2B}" type="datetimeFigureOut">
               <a:rPr lang="he-IL" smtClean="0"/>
-              <a:t>ט"ז/ניסן/תשע"ג</a:t>
+              <a:t>כ"ד/אייר/תשע"ג</a:t>
             </a:fld>
             <a:endParaRPr lang="he-IL"/>
           </a:p>
@@ -1055,7 +1055,7 @@
           <a:p>
             <a:fld id="{D1329CB7-D74C-47FA-A22A-C6A2E8AA6A2B}" type="datetimeFigureOut">
               <a:rPr lang="he-IL" smtClean="0"/>
-              <a:t>ט"ז/ניסן/תשע"ג</a:t>
+              <a:t>כ"ד/אייר/תשע"ג</a:t>
             </a:fld>
             <a:endParaRPr lang="he-IL"/>
           </a:p>
@@ -1343,7 +1343,7 @@
           <a:p>
             <a:fld id="{D1329CB7-D74C-47FA-A22A-C6A2E8AA6A2B}" type="datetimeFigureOut">
               <a:rPr lang="he-IL" smtClean="0"/>
-              <a:t>ט"ז/ניסן/תשע"ג</a:t>
+              <a:t>כ"ד/אייר/תשע"ג</a:t>
             </a:fld>
             <a:endParaRPr lang="he-IL"/>
           </a:p>
@@ -1765,7 +1765,7 @@
           <a:p>
             <a:fld id="{D1329CB7-D74C-47FA-A22A-C6A2E8AA6A2B}" type="datetimeFigureOut">
               <a:rPr lang="he-IL" smtClean="0"/>
-              <a:t>ט"ז/ניסן/תשע"ג</a:t>
+              <a:t>כ"ד/אייר/תשע"ג</a:t>
             </a:fld>
             <a:endParaRPr lang="he-IL"/>
           </a:p>
@@ -1883,7 +1883,7 @@
           <a:p>
             <a:fld id="{D1329CB7-D74C-47FA-A22A-C6A2E8AA6A2B}" type="datetimeFigureOut">
               <a:rPr lang="he-IL" smtClean="0"/>
-              <a:t>ט"ז/ניסן/תשע"ג</a:t>
+              <a:t>כ"ד/אייר/תשע"ג</a:t>
             </a:fld>
             <a:endParaRPr lang="he-IL"/>
           </a:p>
@@ -1978,7 +1978,7 @@
           <a:p>
             <a:fld id="{D1329CB7-D74C-47FA-A22A-C6A2E8AA6A2B}" type="datetimeFigureOut">
               <a:rPr lang="he-IL" smtClean="0"/>
-              <a:t>ט"ז/ניסן/תשע"ג</a:t>
+              <a:t>כ"ד/אייר/תשע"ג</a:t>
             </a:fld>
             <a:endParaRPr lang="he-IL"/>
           </a:p>
@@ -2255,7 +2255,7 @@
           <a:p>
             <a:fld id="{D1329CB7-D74C-47FA-A22A-C6A2E8AA6A2B}" type="datetimeFigureOut">
               <a:rPr lang="he-IL" smtClean="0"/>
-              <a:t>ט"ז/ניסן/תשע"ג</a:t>
+              <a:t>כ"ד/אייר/תשע"ג</a:t>
             </a:fld>
             <a:endParaRPr lang="he-IL"/>
           </a:p>
@@ -2508,7 +2508,7 @@
           <a:p>
             <a:fld id="{D1329CB7-D74C-47FA-A22A-C6A2E8AA6A2B}" type="datetimeFigureOut">
               <a:rPr lang="he-IL" smtClean="0"/>
-              <a:t>ט"ז/ניסן/תשע"ג</a:t>
+              <a:t>כ"ד/אייר/תשע"ג</a:t>
             </a:fld>
             <a:endParaRPr lang="he-IL"/>
           </a:p>
@@ -2721,7 +2721,7 @@
           <a:p>
             <a:fld id="{D1329CB7-D74C-47FA-A22A-C6A2E8AA6A2B}" type="datetimeFigureOut">
               <a:rPr lang="he-IL" smtClean="0"/>
-              <a:t>ט"ז/ניסן/תשע"ג</a:t>
+              <a:t>כ"ד/אייר/תשע"ג</a:t>
             </a:fld>
             <a:endParaRPr lang="he-IL"/>
           </a:p>
@@ -3220,7 +3220,7 @@
         </p:nvSpPr>
         <p:spPr>
           <a:xfrm>
-            <a:off x="6634866" y="4545499"/>
+            <a:off x="6634866" y="4293096"/>
             <a:ext cx="1614994" cy="1224136"/>
           </a:xfrm>
           <a:prstGeom prst="ellipse">
@@ -3262,7 +3262,7 @@
         </p:nvSpPr>
         <p:spPr>
           <a:xfrm>
-            <a:off x="1595878" y="2924944"/>
+            <a:off x="1986811" y="2708920"/>
             <a:ext cx="1987421" cy="1224136"/>
           </a:xfrm>
           <a:prstGeom prst="ellipse">
@@ -3312,7 +3312,7 @@
         </p:nvSpPr>
         <p:spPr>
           <a:xfrm>
-            <a:off x="2062084" y="4966142"/>
+            <a:off x="3213791" y="4806918"/>
             <a:ext cx="2505878" cy="1224136"/>
           </a:xfrm>
           <a:prstGeom prst="ellipse">
@@ -3350,14 +3350,15 @@
         <p:nvCxnSpPr>
           <p:cNvPr id="24" name="Curved Connector 23"/>
           <p:cNvCxnSpPr>
+            <a:stCxn id="8" idx="0"/>
             <a:endCxn id="4" idx="4"/>
           </p:cNvCxnSpPr>
           <p:nvPr/>
         </p:nvCxnSpPr>
         <p:spPr>
           <a:xfrm rot="16200000" flipV="1">
-            <a:off x="2034228" y="1835720"/>
-            <a:ext cx="1387692" cy="1120982"/>
+            <a:off x="2070776" y="1799173"/>
+            <a:ext cx="1006555" cy="812939"/>
           </a:xfrm>
           <a:prstGeom prst="curvedConnector3">
             <a:avLst>
@@ -3392,10 +3393,10 @@
         </p:nvGrpSpPr>
         <p:grpSpPr>
           <a:xfrm>
-            <a:off x="2902064" y="318058"/>
-            <a:ext cx="2675368" cy="772239"/>
-            <a:chOff x="2981234" y="934315"/>
-            <a:chExt cx="4519649" cy="1095996"/>
+            <a:off x="2902064" y="1090294"/>
+            <a:ext cx="2355395" cy="691814"/>
+            <a:chOff x="2981234" y="2030311"/>
+            <a:chExt cx="3979102" cy="981854"/>
           </a:xfrm>
         </p:grpSpPr>
         <p:cxnSp>
@@ -3403,19 +3404,18 @@
             <p:cNvPr id="13" name="Curved Connector 12"/>
             <p:cNvCxnSpPr>
               <a:stCxn id="4" idx="6"/>
-              <a:endCxn id="39" idx="1"/>
+              <a:endCxn id="39" idx="2"/>
             </p:cNvCxnSpPr>
             <p:nvPr/>
           </p:nvCxnSpPr>
           <p:spPr>
-            <a:xfrm flipV="1">
-              <a:off x="2981234" y="1835426"/>
-              <a:ext cx="4519649" cy="194885"/>
+            <a:xfrm>
+              <a:off x="2981234" y="2030311"/>
+              <a:ext cx="3979102" cy="419360"/>
             </a:xfrm>
-            <a:prstGeom prst="curvedConnector4">
+            <a:prstGeom prst="curvedConnector3">
               <a:avLst>
-                <a:gd name="adj1" fmla="val 9129"/>
-                <a:gd name="adj2" fmla="val 265386"/>
+                <a:gd name="adj1" fmla="val 50000"/>
               </a:avLst>
             </a:prstGeom>
             <a:ln>
@@ -3446,8 +3446,8 @@
           </p:nvSpPr>
           <p:spPr>
             <a:xfrm>
-              <a:off x="4670862" y="934315"/>
-              <a:ext cx="2814927" cy="524172"/>
+              <a:off x="3697683" y="2487992"/>
+              <a:ext cx="2814928" cy="524173"/>
             </a:xfrm>
             <a:prstGeom prst="rect">
               <a:avLst/>
@@ -3474,164 +3474,16 @@
       </p:grpSp>
       <p:grpSp>
         <p:nvGrpSpPr>
-          <p:cNvPr id="18" name="Group 17"/>
-          <p:cNvGrpSpPr/>
-          <p:nvPr/>
-        </p:nvGrpSpPr>
-        <p:grpSpPr>
-          <a:xfrm>
-            <a:off x="-283201" y="1523094"/>
-            <a:ext cx="9761388" cy="1905908"/>
-            <a:chOff x="747163" y="901554"/>
-            <a:chExt cx="7885396" cy="1521671"/>
-          </a:xfrm>
-        </p:grpSpPr>
-        <p:cxnSp>
-          <p:nvCxnSpPr>
-            <p:cNvPr id="41" name="Curved Connector 40"/>
-            <p:cNvCxnSpPr>
-              <a:endCxn id="4" idx="5"/>
-            </p:cNvCxnSpPr>
-            <p:nvPr/>
-          </p:nvCxnSpPr>
-          <p:spPr>
-            <a:xfrm rot="10800000">
-              <a:off x="3146487" y="901554"/>
-              <a:ext cx="5486072" cy="1521671"/>
-            </a:xfrm>
-            <a:prstGeom prst="curvedConnector2">
-              <a:avLst/>
-            </a:prstGeom>
-            <a:ln>
-              <a:headEnd type="none" w="med" len="med"/>
-              <a:tailEnd type="triangle" w="med" len="med"/>
-            </a:ln>
-          </p:spPr>
-          <p:style>
-            <a:lnRef idx="3">
-              <a:schemeClr val="dk1"/>
-            </a:lnRef>
-            <a:fillRef idx="0">
-              <a:schemeClr val="dk1"/>
-            </a:fillRef>
-            <a:effectRef idx="2">
-              <a:schemeClr val="dk1"/>
-            </a:effectRef>
-            <a:fontRef idx="minor">
-              <a:schemeClr val="tx1"/>
-            </a:fontRef>
-          </p:style>
-        </p:cxnSp>
-        <p:sp>
-          <p:nvSpPr>
-            <p:cNvPr id="47" name="TextBox 46"/>
-            <p:cNvSpPr txBox="1"/>
-            <p:nvPr/>
-          </p:nvSpPr>
-          <p:spPr>
-            <a:xfrm>
-              <a:off x="747163" y="1230055"/>
-              <a:ext cx="2399324" cy="737184"/>
-            </a:xfrm>
-            <a:prstGeom prst="rect">
-              <a:avLst/>
-            </a:prstGeom>
-            <a:solidFill>
-              <a:srgbClr val="FFCC99">
-                <a:alpha val="23137"/>
-              </a:srgbClr>
-            </a:solidFill>
-            <a:ln>
-              <a:noFill/>
-              <a:headEnd type="none" w="med" len="med"/>
-              <a:tailEnd type="triangle" w="med" len="med"/>
-            </a:ln>
-          </p:spPr>
-          <p:style>
-            <a:lnRef idx="2">
-              <a:schemeClr val="dk1"/>
-            </a:lnRef>
-            <a:fillRef idx="1">
-              <a:schemeClr val="lt1"/>
-            </a:fillRef>
-            <a:effectRef idx="0">
-              <a:schemeClr val="dk1"/>
-            </a:effectRef>
-            <a:fontRef idx="minor">
-              <a:schemeClr val="dk1"/>
-            </a:fontRef>
-          </p:style>
-          <p:txBody>
-            <a:bodyPr wrap="square" rtlCol="1">
-              <a:spAutoFit/>
-            </a:bodyPr>
-            <a:lstStyle/>
-            <a:p>
-              <a:pPr algn="l"/>
-              <a:r>
-                <a:rPr lang="en-US" dirty="0" err="1" smtClean="0"/>
-                <a:t>Finish_image</a:t>
-              </a:r>
-              <a:r>
-                <a:rPr lang="en-US" dirty="0" smtClean="0"/>
-                <a:t>=1</a:t>
-              </a:r>
-              <a:br>
-                <a:rPr lang="en-US" dirty="0" smtClean="0"/>
-              </a:br>
-              <a:r>
-                <a:rPr lang="en-US" dirty="0" smtClean="0">
-                  <a:solidFill>
-                    <a:schemeClr val="accent3">
-                      <a:lumMod val="50000"/>
-                    </a:schemeClr>
-                  </a:solidFill>
-                </a:rPr>
-                <a:t>return to idle after complete full </a:t>
-              </a:r>
-              <a:r>
-                <a:rPr lang="en-US" dirty="0" err="1" smtClean="0">
-                  <a:solidFill>
-                    <a:schemeClr val="accent3">
-                      <a:lumMod val="50000"/>
-                    </a:schemeClr>
-                  </a:solidFill>
-                </a:rPr>
-                <a:t>calc</a:t>
-              </a:r>
-              <a:r>
-                <a:rPr lang="en-US" dirty="0" smtClean="0">
-                  <a:solidFill>
-                    <a:schemeClr val="accent3">
-                      <a:lumMod val="50000"/>
-                    </a:schemeClr>
-                  </a:solidFill>
-                </a:rPr>
-                <a:t> cycle </a:t>
-              </a:r>
-              <a:endParaRPr lang="en-US" sz="2000" dirty="0">
-                <a:solidFill>
-                  <a:schemeClr val="accent3">
-                    <a:lumMod val="50000"/>
-                  </a:schemeClr>
-                </a:solidFill>
-              </a:endParaRPr>
-            </a:p>
-          </p:txBody>
-        </p:sp>
-      </p:grpSp>
-      <p:grpSp>
-        <p:nvGrpSpPr>
           <p:cNvPr id="10" name="Group 9"/>
           <p:cNvGrpSpPr/>
           <p:nvPr/>
         </p:nvGrpSpPr>
         <p:grpSpPr>
           <a:xfrm>
-            <a:off x="8249861" y="4149080"/>
-            <a:ext cx="2914461" cy="1562485"/>
-            <a:chOff x="8249861" y="4149080"/>
-            <a:chExt cx="2914461" cy="1562485"/>
+            <a:off x="8249860" y="4149081"/>
+            <a:ext cx="2722940" cy="1562484"/>
+            <a:chOff x="8249860" y="4149081"/>
+            <a:chExt cx="2722940" cy="1562484"/>
           </a:xfrm>
         </p:grpSpPr>
         <p:cxnSp>
@@ -3645,8 +3497,8 @@
           </p:nvCxnSpPr>
           <p:spPr>
             <a:xfrm rot="5400000">
-              <a:off x="8734319" y="3664622"/>
-              <a:ext cx="1008487" cy="1977403"/>
+              <a:off x="8860520" y="3538421"/>
+              <a:ext cx="756084" cy="1977403"/>
             </a:xfrm>
             <a:prstGeom prst="curvedConnector2">
               <a:avLst/>
@@ -3679,8 +3531,8 @@
           </p:nvSpPr>
           <p:spPr>
             <a:xfrm>
-              <a:off x="8510736" y="5157567"/>
-              <a:ext cx="2653586" cy="553998"/>
+              <a:off x="8438728" y="5157567"/>
+              <a:ext cx="2534072" cy="553998"/>
             </a:xfrm>
             <a:prstGeom prst="rect">
               <a:avLst/>
@@ -3764,10 +3616,10 @@
         </p:nvGrpSpPr>
         <p:grpSpPr>
           <a:xfrm>
-            <a:off x="3583300" y="3535103"/>
-            <a:ext cx="5898427" cy="861774"/>
-            <a:chOff x="3662179" y="3535103"/>
-            <a:chExt cx="5898427" cy="861774"/>
+            <a:off x="1907042" y="3537011"/>
+            <a:ext cx="7774171" cy="1716413"/>
+            <a:chOff x="1985921" y="3537011"/>
+            <a:chExt cx="7774171" cy="1716413"/>
           </a:xfrm>
         </p:grpSpPr>
         <p:cxnSp>
@@ -3775,19 +3627,17 @@
             <p:cNvPr id="29" name="Curved Connector 28"/>
             <p:cNvCxnSpPr>
               <a:stCxn id="6" idx="2"/>
-              <a:endCxn id="8" idx="6"/>
+              <a:endCxn id="33" idx="7"/>
             </p:cNvCxnSpPr>
             <p:nvPr/>
           </p:nvCxnSpPr>
           <p:spPr>
-            <a:xfrm rot="10800000">
-              <a:off x="3662179" y="3537012"/>
-              <a:ext cx="5898427" cy="12700"/>
+            <a:xfrm rot="10800000" flipV="1">
+              <a:off x="1985921" y="3537011"/>
+              <a:ext cx="7574684" cy="1716413"/>
             </a:xfrm>
-            <a:prstGeom prst="curvedConnector3">
-              <a:avLst>
-                <a:gd name="adj1" fmla="val 50000"/>
-              </a:avLst>
+            <a:prstGeom prst="curvedConnector2">
+              <a:avLst/>
             </a:prstGeom>
             <a:ln>
               <a:headEnd type="none" w="med" len="med"/>
@@ -3817,8 +3667,8 @@
           </p:nvSpPr>
           <p:spPr>
             <a:xfrm>
-              <a:off x="4515823" y="3535103"/>
-              <a:ext cx="2653586" cy="861774"/>
+              <a:off x="6222582" y="3625635"/>
+              <a:ext cx="3537510" cy="584775"/>
             </a:xfrm>
             <a:prstGeom prst="rect">
               <a:avLst/>
@@ -3872,10 +3722,10 @@
         </p:nvGrpSpPr>
         <p:grpSpPr>
           <a:xfrm>
-            <a:off x="4567962" y="5578210"/>
-            <a:ext cx="2303414" cy="337875"/>
-            <a:chOff x="4567962" y="5578210"/>
-            <a:chExt cx="2303414" cy="337875"/>
+            <a:off x="5386574" y="5337961"/>
+            <a:ext cx="1514258" cy="600286"/>
+            <a:chOff x="5386574" y="5337961"/>
+            <a:chExt cx="1514258" cy="600286"/>
           </a:xfrm>
         </p:grpSpPr>
         <p:cxnSp>
@@ -3888,14 +3738,14 @@
             <p:nvPr/>
           </p:nvCxnSpPr>
           <p:spPr>
-            <a:xfrm rot="5400000" flipH="1">
-              <a:off x="5713592" y="4432580"/>
-              <a:ext cx="12154" cy="2303414"/>
+            <a:xfrm rot="5400000">
+              <a:off x="6255011" y="4802620"/>
+              <a:ext cx="81025" cy="1151707"/>
             </a:xfrm>
             <a:prstGeom prst="curvedConnector4">
               <a:avLst>
-                <a:gd name="adj1" fmla="val -4702156"/>
-                <a:gd name="adj2" fmla="val 70848"/>
+                <a:gd name="adj1" fmla="val 282135"/>
+                <a:gd name="adj2" fmla="val 60268"/>
               </a:avLst>
             </a:prstGeom>
             <a:ln>
@@ -3926,7 +3776,7 @@
           </p:nvSpPr>
           <p:spPr>
             <a:xfrm>
-              <a:off x="4835654" y="5639086"/>
+              <a:off x="5386574" y="5661248"/>
               <a:ext cx="1514258" cy="276999"/>
             </a:xfrm>
             <a:prstGeom prst="rect">
@@ -3962,10 +3812,10 @@
         </p:nvGrpSpPr>
         <p:grpSpPr>
           <a:xfrm>
-            <a:off x="843416" y="3969810"/>
-            <a:ext cx="1218669" cy="1608401"/>
-            <a:chOff x="843416" y="3969810"/>
-            <a:chExt cx="1218669" cy="1608401"/>
+            <a:off x="2143553" y="5418986"/>
+            <a:ext cx="1108964" cy="578471"/>
+            <a:chOff x="2143553" y="5418986"/>
+            <a:chExt cx="1108964" cy="578471"/>
           </a:xfrm>
         </p:grpSpPr>
         <p:cxnSp>
@@ -3973,17 +3823,19 @@
             <p:cNvPr id="21" name="Curved Connector 20"/>
             <p:cNvCxnSpPr>
               <a:stCxn id="9" idx="2"/>
-              <a:endCxn id="8" idx="3"/>
+              <a:endCxn id="33" idx="6"/>
             </p:cNvCxnSpPr>
             <p:nvPr/>
           </p:nvCxnSpPr>
           <p:spPr>
-            <a:xfrm rot="10800000">
-              <a:off x="1886930" y="3969810"/>
-              <a:ext cx="175155" cy="1608401"/>
+            <a:xfrm rot="10800000" flipV="1">
+              <a:off x="2143553" y="5418986"/>
+              <a:ext cx="1070239" cy="267236"/>
             </a:xfrm>
-            <a:prstGeom prst="curvedConnector2">
-              <a:avLst/>
+            <a:prstGeom prst="curvedConnector3">
+              <a:avLst>
+                <a:gd name="adj1" fmla="val 50000"/>
+              </a:avLst>
             </a:prstGeom>
             <a:ln>
               <a:headEnd type="none" w="med" len="med"/>
@@ -4013,7 +3865,7 @@
           </p:nvSpPr>
           <p:spPr>
             <a:xfrm>
-              <a:off x="843416" y="4797155"/>
+              <a:off x="2145676" y="5720458"/>
               <a:ext cx="1106841" cy="276999"/>
             </a:xfrm>
             <a:prstGeom prst="rect">
@@ -4077,150 +3929,19 @@
           </a:p>
         </p:txBody>
       </p:sp>
-      <p:grpSp>
-        <p:nvGrpSpPr>
-          <p:cNvPr id="3" name="Group 2"/>
-          <p:cNvGrpSpPr/>
-          <p:nvPr/>
-        </p:nvGrpSpPr>
-        <p:grpSpPr>
-          <a:xfrm>
-            <a:off x="7442363" y="1090297"/>
-            <a:ext cx="2784900" cy="1834647"/>
-            <a:chOff x="9419569" y="2682252"/>
-            <a:chExt cx="2784900" cy="1834647"/>
-          </a:xfrm>
-        </p:grpSpPr>
-        <p:cxnSp>
-          <p:nvCxnSpPr>
-            <p:cNvPr id="17" name="Curved Connector 16"/>
-            <p:cNvCxnSpPr>
-              <a:stCxn id="39" idx="6"/>
-              <a:endCxn id="6" idx="0"/>
-            </p:cNvCxnSpPr>
-            <p:nvPr/>
-          </p:nvCxnSpPr>
-          <p:spPr>
-            <a:xfrm>
-              <a:off x="9419569" y="2977733"/>
-              <a:ext cx="2784900" cy="1539166"/>
-            </a:xfrm>
-            <a:prstGeom prst="curvedConnector2">
-              <a:avLst/>
-            </a:prstGeom>
-            <a:ln>
-              <a:headEnd type="none" w="med" len="med"/>
-              <a:tailEnd type="triangle" w="med" len="med"/>
-            </a:ln>
-          </p:spPr>
-          <p:style>
-            <a:lnRef idx="3">
-              <a:schemeClr val="dk1"/>
-            </a:lnRef>
-            <a:fillRef idx="0">
-              <a:schemeClr val="dk1"/>
-            </a:fillRef>
-            <a:effectRef idx="2">
-              <a:schemeClr val="dk1"/>
-            </a:effectRef>
-            <a:fontRef idx="minor">
-              <a:schemeClr val="tx1"/>
-            </a:fontRef>
-          </p:style>
-        </p:cxnSp>
-        <p:sp>
-          <p:nvSpPr>
-            <p:cNvPr id="38" name="TextBox 37"/>
-            <p:cNvSpPr txBox="1"/>
-            <p:nvPr/>
-          </p:nvSpPr>
-          <p:spPr>
-            <a:xfrm>
-              <a:off x="9966147" y="2682252"/>
-              <a:ext cx="1745931" cy="369332"/>
-            </a:xfrm>
-            <a:prstGeom prst="rect">
-              <a:avLst/>
-            </a:prstGeom>
-            <a:solidFill>
-              <a:srgbClr val="FFCC99">
-                <a:alpha val="30196"/>
-              </a:srgbClr>
-            </a:solidFill>
-          </p:spPr>
-          <p:txBody>
-            <a:bodyPr wrap="square" rtlCol="1">
-              <a:spAutoFit/>
-            </a:bodyPr>
-            <a:lstStyle/>
-            <a:p>
-              <a:pPr algn="l"/>
-              <a:r>
-                <a:rPr lang="en-US" dirty="0" err="1" smtClean="0"/>
-                <a:t>Finish_image</a:t>
-              </a:r>
-              <a:r>
-                <a:rPr lang="en-US" dirty="0" smtClean="0"/>
-                <a:t>=0</a:t>
-              </a:r>
-            </a:p>
-          </p:txBody>
-        </p:sp>
-      </p:grpSp>
-      <p:sp>
-        <p:nvSpPr>
-          <p:cNvPr id="39" name="Oval 38"/>
-          <p:cNvSpPr/>
-          <p:nvPr/>
-        </p:nvSpPr>
-        <p:spPr>
-          <a:xfrm>
-            <a:off x="5257460" y="773710"/>
-            <a:ext cx="2184903" cy="1224136"/>
-          </a:xfrm>
-          <a:prstGeom prst="ellipse">
-            <a:avLst/>
-          </a:prstGeom>
-        </p:spPr>
-        <p:style>
-          <a:lnRef idx="3">
-            <a:schemeClr val="lt1"/>
-          </a:lnRef>
-          <a:fillRef idx="1">
-            <a:schemeClr val="accent4"/>
-          </a:fillRef>
-          <a:effectRef idx="1">
-            <a:schemeClr val="accent4"/>
-          </a:effectRef>
-          <a:fontRef idx="minor">
-            <a:schemeClr val="lt1"/>
-          </a:fontRef>
-        </p:style>
-        <p:txBody>
-          <a:bodyPr rtlCol="1" anchor="ctr"/>
-          <a:lstStyle/>
-          <a:p>
-            <a:pPr algn="ctr"/>
-            <a:r>
-              <a:rPr lang="en-US" b="1" dirty="0" smtClean="0"/>
-              <a:t>Increment Coordinate</a:t>
-            </a:r>
-            <a:endParaRPr lang="he-IL" b="1" dirty="0"/>
-          </a:p>
-        </p:txBody>
-      </p:sp>
       <p:cxnSp>
         <p:nvCxnSpPr>
-          <p:cNvPr id="32" name="Curved Connector 31"/>
+          <p:cNvPr id="17" name="Curved Connector 16"/>
           <p:cNvCxnSpPr>
-            <a:endCxn id="39" idx="3"/>
+            <a:stCxn id="39" idx="6"/>
+            <a:endCxn id="6" idx="0"/>
           </p:cNvCxnSpPr>
           <p:nvPr/>
         </p:nvCxnSpPr>
         <p:spPr>
-          <a:xfrm flipV="1">
-            <a:off x="3440965" y="1818575"/>
-            <a:ext cx="2136467" cy="1423882"/>
+          <a:xfrm>
+            <a:off x="7442363" y="1385778"/>
+            <a:ext cx="2784900" cy="1539166"/>
           </a:xfrm>
           <a:prstGeom prst="curvedConnector2">
             <a:avLst/>
@@ -4247,14 +3968,213 @@
       </p:cxnSp>
       <p:sp>
         <p:nvSpPr>
-          <p:cNvPr id="34" name="TextBox 33"/>
+          <p:cNvPr id="39" name="Oval 38"/>
+          <p:cNvSpPr/>
+          <p:nvPr/>
+        </p:nvSpPr>
+        <p:spPr>
+          <a:xfrm>
+            <a:off x="5257460" y="773710"/>
+            <a:ext cx="2184903" cy="1224136"/>
+          </a:xfrm>
+          <a:prstGeom prst="ellipse">
+            <a:avLst/>
+          </a:prstGeom>
+        </p:spPr>
+        <p:style>
+          <a:lnRef idx="3">
+            <a:schemeClr val="lt1"/>
+          </a:lnRef>
+          <a:fillRef idx="1">
+            <a:schemeClr val="accent4"/>
+          </a:fillRef>
+          <a:effectRef idx="1">
+            <a:schemeClr val="accent4"/>
+          </a:effectRef>
+          <a:fontRef idx="minor">
+            <a:schemeClr val="lt1"/>
+          </a:fontRef>
+        </p:style>
+        <p:txBody>
+          <a:bodyPr rtlCol="1" anchor="ctr"/>
+          <a:lstStyle/>
+          <a:p>
+            <a:pPr algn="ctr"/>
+            <a:r>
+              <a:rPr lang="en-US" b="1" dirty="0" smtClean="0"/>
+              <a:t>Increment Coordinate</a:t>
+            </a:r>
+            <a:endParaRPr lang="he-IL" b="1" dirty="0"/>
+          </a:p>
+        </p:txBody>
+      </p:sp>
+      <p:cxnSp>
+        <p:nvCxnSpPr>
+          <p:cNvPr id="32" name="Curved Connector 31"/>
+          <p:cNvCxnSpPr>
+            <a:stCxn id="8" idx="7"/>
+            <a:endCxn id="39" idx="3"/>
+          </p:cNvCxnSpPr>
+          <p:nvPr/>
+        </p:nvCxnSpPr>
+        <p:spPr>
+          <a:xfrm rot="5400000" flipH="1" flipV="1">
+            <a:off x="4095498" y="1406258"/>
+            <a:ext cx="1069616" cy="1894251"/>
+          </a:xfrm>
+          <a:prstGeom prst="curvedConnector3">
+            <a:avLst>
+              <a:gd name="adj1" fmla="val 50000"/>
+            </a:avLst>
+          </a:prstGeom>
+          <a:ln>
+            <a:headEnd type="none" w="med" len="med"/>
+            <a:tailEnd type="triangle" w="med" len="med"/>
+          </a:ln>
+        </p:spPr>
+        <p:style>
+          <a:lnRef idx="3">
+            <a:schemeClr val="dk1"/>
+          </a:lnRef>
+          <a:fillRef idx="0">
+            <a:schemeClr val="dk1"/>
+          </a:fillRef>
+          <a:effectRef idx="2">
+            <a:schemeClr val="dk1"/>
+          </a:effectRef>
+          <a:fontRef idx="minor">
+            <a:schemeClr val="tx1"/>
+          </a:fontRef>
+        </p:style>
+      </p:cxnSp>
+      <p:sp>
+        <p:nvSpPr>
+          <p:cNvPr id="33" name="Oval 32"/>
+          <p:cNvSpPr/>
+          <p:nvPr/>
+        </p:nvSpPr>
+        <p:spPr>
+          <a:xfrm>
+            <a:off x="528558" y="5074154"/>
+            <a:ext cx="1614994" cy="1224136"/>
+          </a:xfrm>
+          <a:prstGeom prst="ellipse">
+            <a:avLst/>
+          </a:prstGeom>
+        </p:spPr>
+        <p:style>
+          <a:lnRef idx="3">
+            <a:schemeClr val="lt1"/>
+          </a:lnRef>
+          <a:fillRef idx="1">
+            <a:schemeClr val="accent4"/>
+          </a:fillRef>
+          <a:effectRef idx="1">
+            <a:schemeClr val="accent4"/>
+          </a:effectRef>
+          <a:fontRef idx="minor">
+            <a:schemeClr val="lt1"/>
+          </a:fontRef>
+        </p:style>
+        <p:txBody>
+          <a:bodyPr rtlCol="1" anchor="ctr"/>
+          <a:lstStyle/>
+          <a:p>
+            <a:pPr algn="ctr"/>
+            <a:r>
+              <a:rPr lang="en-US" b="1" dirty="0" smtClean="0"/>
+              <a:t>Result to RAM</a:t>
+            </a:r>
+            <a:endParaRPr lang="he-IL" b="1" dirty="0"/>
+          </a:p>
+        </p:txBody>
+      </p:sp>
+      <p:cxnSp>
+        <p:nvCxnSpPr>
+          <p:cNvPr id="43" name="Curved Connector 42"/>
+          <p:cNvCxnSpPr>
+            <a:stCxn id="33" idx="0"/>
+            <a:endCxn id="8" idx="2"/>
+          </p:cNvCxnSpPr>
+          <p:nvPr/>
+        </p:nvCxnSpPr>
+        <p:spPr>
+          <a:xfrm rot="5400000" flipH="1" flipV="1">
+            <a:off x="784850" y="3872193"/>
+            <a:ext cx="1753166" cy="650756"/>
+          </a:xfrm>
+          <a:prstGeom prst="curvedConnector2">
+            <a:avLst/>
+          </a:prstGeom>
+          <a:ln>
+            <a:headEnd type="none" w="med" len="med"/>
+            <a:tailEnd type="triangle" w="med" len="med"/>
+          </a:ln>
+        </p:spPr>
+        <p:style>
+          <a:lnRef idx="3">
+            <a:schemeClr val="dk1"/>
+          </a:lnRef>
+          <a:fillRef idx="0">
+            <a:schemeClr val="dk1"/>
+          </a:fillRef>
+          <a:effectRef idx="2">
+            <a:schemeClr val="dk1"/>
+          </a:effectRef>
+          <a:fontRef idx="minor">
+            <a:schemeClr val="tx1"/>
+          </a:fontRef>
+        </p:style>
+      </p:cxnSp>
+      <p:cxnSp>
+        <p:nvCxnSpPr>
+          <p:cNvPr id="45" name="Curved Connector 44"/>
+          <p:cNvCxnSpPr>
+            <a:stCxn id="39" idx="1"/>
+            <a:endCxn id="4" idx="7"/>
+          </p:cNvCxnSpPr>
+          <p:nvPr/>
+        </p:nvCxnSpPr>
+        <p:spPr>
+          <a:xfrm rot="16200000" flipV="1">
+            <a:off x="3984446" y="-640006"/>
+            <a:ext cx="295481" cy="2890493"/>
+          </a:xfrm>
+          <a:prstGeom prst="curvedConnector3">
+            <a:avLst>
+              <a:gd name="adj1" fmla="val 238036"/>
+            </a:avLst>
+          </a:prstGeom>
+          <a:ln>
+            <a:headEnd type="none" w="med" len="med"/>
+            <a:tailEnd type="triangle" w="med" len="med"/>
+          </a:ln>
+        </p:spPr>
+        <p:style>
+          <a:lnRef idx="3">
+            <a:schemeClr val="dk1"/>
+          </a:lnRef>
+          <a:fillRef idx="0">
+            <a:schemeClr val="dk1"/>
+          </a:fillRef>
+          <a:effectRef idx="2">
+            <a:schemeClr val="dk1"/>
+          </a:effectRef>
+          <a:fontRef idx="minor">
+            <a:schemeClr val="tx1"/>
+          </a:fontRef>
+        </p:style>
+      </p:cxnSp>
+      <p:sp>
+        <p:nvSpPr>
+          <p:cNvPr id="54" name="TextBox 53"/>
           <p:cNvSpPr txBox="1"/>
           <p:nvPr/>
         </p:nvSpPr>
         <p:spPr>
           <a:xfrm>
-            <a:off x="5396653" y="2195572"/>
-            <a:ext cx="1745931" cy="369332"/>
+            <a:off x="3186881" y="348850"/>
+            <a:ext cx="1435423" cy="369332"/>
           </a:xfrm>
           <a:prstGeom prst="rect">
             <a:avLst/>
@@ -4274,12 +4194,440 @@
             <a:pPr algn="l"/>
             <a:r>
               <a:rPr lang="en-US" dirty="0" err="1" smtClean="0"/>
-              <a:t>Finish_image</a:t>
+              <a:t>Final_Pixel</a:t>
+            </a:r>
+            <a:r>
+              <a:rPr lang="en-US" dirty="0" smtClean="0"/>
+              <a:t>=1</a:t>
+            </a:r>
+            <a:endParaRPr lang="en-US" dirty="0" smtClean="0"/>
+          </a:p>
+        </p:txBody>
+      </p:sp>
+      <p:sp>
+        <p:nvSpPr>
+          <p:cNvPr id="55" name="TextBox 54"/>
+          <p:cNvSpPr txBox="1"/>
+          <p:nvPr/>
+        </p:nvSpPr>
+        <p:spPr>
+          <a:xfrm>
+            <a:off x="9374832" y="1616056"/>
+            <a:ext cx="1435423" cy="369332"/>
+          </a:xfrm>
+          <a:prstGeom prst="rect">
+            <a:avLst/>
+          </a:prstGeom>
+          <a:solidFill>
+            <a:srgbClr val="FFCC99">
+              <a:alpha val="30196"/>
+            </a:srgbClr>
+          </a:solidFill>
+        </p:spPr>
+        <p:txBody>
+          <a:bodyPr wrap="square" rtlCol="1">
+            <a:spAutoFit/>
+          </a:bodyPr>
+          <a:lstStyle/>
+          <a:p>
+            <a:pPr algn="l"/>
+            <a:r>
+              <a:rPr lang="en-US" dirty="0" err="1" smtClean="0"/>
+              <a:t>Final_Pixel</a:t>
             </a:r>
             <a:r>
               <a:rPr lang="en-US" dirty="0" smtClean="0"/>
               <a:t>=0</a:t>
             </a:r>
+            <a:endParaRPr lang="en-US" dirty="0" smtClean="0"/>
+          </a:p>
+        </p:txBody>
+      </p:sp>
+      <p:sp>
+        <p:nvSpPr>
+          <p:cNvPr id="36" name="Rectangle 35"/>
+          <p:cNvSpPr/>
+          <p:nvPr/>
+        </p:nvSpPr>
+        <p:spPr>
+          <a:xfrm>
+            <a:off x="6634866" y="6298290"/>
+            <a:ext cx="1596669" cy="559710"/>
+          </a:xfrm>
+          <a:prstGeom prst="rect">
+            <a:avLst/>
+          </a:prstGeom>
+          <a:ln>
+            <a:noFill/>
+          </a:ln>
+          <a:effectLst>
+            <a:outerShdw blurRad="225425" dist="50800" dir="5220000" algn="ctr">
+              <a:srgbClr val="000000">
+                <a:alpha val="33000"/>
+              </a:srgbClr>
+            </a:outerShdw>
+          </a:effectLst>
+          <a:scene3d>
+            <a:camera prst="perspectiveFront" fov="3300000">
+              <a:rot lat="486000" lon="19530000" rev="174000"/>
+            </a:camera>
+            <a:lightRig rig="harsh" dir="t">
+              <a:rot lat="0" lon="0" rev="3000000"/>
+            </a:lightRig>
+          </a:scene3d>
+          <a:sp3d extrusionH="254000" contourW="19050">
+            <a:bevelT w="82550" h="44450" prst="angle"/>
+            <a:bevelB w="82550" h="44450" prst="angle"/>
+            <a:contourClr>
+              <a:srgbClr val="FFFFFF"/>
+            </a:contourClr>
+          </a:sp3d>
+        </p:spPr>
+        <p:style>
+          <a:lnRef idx="0">
+            <a:schemeClr val="accent6"/>
+          </a:lnRef>
+          <a:fillRef idx="3">
+            <a:schemeClr val="accent6"/>
+          </a:fillRef>
+          <a:effectRef idx="3">
+            <a:schemeClr val="accent6"/>
+          </a:effectRef>
+          <a:fontRef idx="minor">
+            <a:schemeClr val="lt1"/>
+          </a:fontRef>
+        </p:style>
+        <p:txBody>
+          <a:bodyPr rtlCol="1" anchor="ctr"/>
+          <a:lstStyle/>
+          <a:p>
+            <a:pPr algn="ctr"/>
+            <a:r>
+              <a:rPr lang="en-US" b="1" dirty="0" err="1" smtClean="0">
+                <a:solidFill>
+                  <a:schemeClr val="tx1"/>
+                </a:solidFill>
+              </a:rPr>
+              <a:t>Read_FSM</a:t>
+            </a:r>
+            <a:endParaRPr lang="he-IL" b="1" dirty="0">
+              <a:solidFill>
+                <a:schemeClr val="tx1"/>
+              </a:solidFill>
+            </a:endParaRPr>
+          </a:p>
+        </p:txBody>
+      </p:sp>
+      <p:sp>
+        <p:nvSpPr>
+          <p:cNvPr id="58" name="Up-Down Arrow 57"/>
+          <p:cNvSpPr/>
+          <p:nvPr/>
+        </p:nvSpPr>
+        <p:spPr>
+          <a:xfrm>
+            <a:off x="7214592" y="5552604"/>
+            <a:ext cx="432048" cy="745687"/>
+          </a:xfrm>
+          <a:prstGeom prst="upDownArrow">
+            <a:avLst>
+              <a:gd name="adj1" fmla="val 27805"/>
+              <a:gd name="adj2" fmla="val 55443"/>
+            </a:avLst>
+          </a:prstGeom>
+        </p:spPr>
+        <p:style>
+          <a:lnRef idx="1">
+            <a:schemeClr val="dk1"/>
+          </a:lnRef>
+          <a:fillRef idx="2">
+            <a:schemeClr val="dk1"/>
+          </a:fillRef>
+          <a:effectRef idx="1">
+            <a:schemeClr val="dk1"/>
+          </a:effectRef>
+          <a:fontRef idx="minor">
+            <a:schemeClr val="dk1"/>
+          </a:fontRef>
+        </p:style>
+        <p:txBody>
+          <a:bodyPr rtlCol="1" anchor="ctr"/>
+          <a:lstStyle/>
+          <a:p>
+            <a:pPr algn="ctr"/>
+            <a:endParaRPr lang="he-IL"/>
+          </a:p>
+        </p:txBody>
+      </p:sp>
+      <p:sp>
+        <p:nvSpPr>
+          <p:cNvPr id="59" name="Up-Down Arrow 58"/>
+          <p:cNvSpPr/>
+          <p:nvPr/>
+        </p:nvSpPr>
+        <p:spPr>
+          <a:xfrm rot="16200000">
+            <a:off x="1379854" y="2768125"/>
+            <a:ext cx="432048" cy="745687"/>
+          </a:xfrm>
+          <a:prstGeom prst="upDownArrow">
+            <a:avLst>
+              <a:gd name="adj1" fmla="val 27805"/>
+              <a:gd name="adj2" fmla="val 55443"/>
+            </a:avLst>
+          </a:prstGeom>
+        </p:spPr>
+        <p:style>
+          <a:lnRef idx="1">
+            <a:schemeClr val="dk1"/>
+          </a:lnRef>
+          <a:fillRef idx="2">
+            <a:schemeClr val="dk1"/>
+          </a:fillRef>
+          <a:effectRef idx="1">
+            <a:schemeClr val="dk1"/>
+          </a:effectRef>
+          <a:fontRef idx="minor">
+            <a:schemeClr val="dk1"/>
+          </a:fontRef>
+        </p:style>
+        <p:txBody>
+          <a:bodyPr rtlCol="1" anchor="ctr"/>
+          <a:lstStyle/>
+          <a:p>
+            <a:pPr algn="ctr"/>
+            <a:endParaRPr lang="he-IL"/>
+          </a:p>
+        </p:txBody>
+      </p:sp>
+      <p:sp>
+        <p:nvSpPr>
+          <p:cNvPr id="62" name="Rectangle 61"/>
+          <p:cNvSpPr/>
+          <p:nvPr/>
+        </p:nvSpPr>
+        <p:spPr>
+          <a:xfrm>
+            <a:off x="-214725" y="3157322"/>
+            <a:ext cx="1596669" cy="559710"/>
+          </a:xfrm>
+          <a:prstGeom prst="rect">
+            <a:avLst/>
+          </a:prstGeom>
+          <a:ln>
+            <a:noFill/>
+          </a:ln>
+          <a:effectLst>
+            <a:outerShdw blurRad="225425" dist="50800" dir="5220000" algn="ctr">
+              <a:srgbClr val="000000">
+                <a:alpha val="33000"/>
+              </a:srgbClr>
+            </a:outerShdw>
+          </a:effectLst>
+          <a:scene3d>
+            <a:camera prst="perspectiveFront" fov="3300000">
+              <a:rot lat="486000" lon="19530000" rev="174000"/>
+            </a:camera>
+            <a:lightRig rig="harsh" dir="t">
+              <a:rot lat="0" lon="0" rev="3000000"/>
+            </a:lightRig>
+          </a:scene3d>
+          <a:sp3d extrusionH="254000" contourW="19050">
+            <a:bevelT w="82550" h="44450" prst="angle"/>
+            <a:bevelB w="82550" h="44450" prst="angle"/>
+            <a:contourClr>
+              <a:srgbClr val="FFFFFF"/>
+            </a:contourClr>
+          </a:sp3d>
+        </p:spPr>
+        <p:style>
+          <a:lnRef idx="0">
+            <a:schemeClr val="accent6"/>
+          </a:lnRef>
+          <a:fillRef idx="3">
+            <a:schemeClr val="accent6"/>
+          </a:fillRef>
+          <a:effectRef idx="3">
+            <a:schemeClr val="accent6"/>
+          </a:effectRef>
+          <a:fontRef idx="minor">
+            <a:schemeClr val="lt1"/>
+          </a:fontRef>
+        </p:style>
+        <p:txBody>
+          <a:bodyPr rtlCol="1" anchor="ctr"/>
+          <a:lstStyle/>
+          <a:p>
+            <a:pPr algn="ctr"/>
+            <a:r>
+              <a:rPr lang="en-US" b="1" dirty="0" err="1" smtClean="0">
+                <a:solidFill>
+                  <a:schemeClr val="tx1"/>
+                </a:solidFill>
+              </a:rPr>
+              <a:t>Write_FSM</a:t>
+            </a:r>
+            <a:endParaRPr lang="he-IL" b="1" dirty="0">
+              <a:solidFill>
+                <a:schemeClr val="tx1"/>
+              </a:solidFill>
+            </a:endParaRPr>
+          </a:p>
+        </p:txBody>
+      </p:sp>
+      <p:sp>
+        <p:nvSpPr>
+          <p:cNvPr id="63" name="TextBox 62"/>
+          <p:cNvSpPr txBox="1"/>
+          <p:nvPr/>
+        </p:nvSpPr>
+        <p:spPr>
+          <a:xfrm>
+            <a:off x="79182" y="4025886"/>
+            <a:ext cx="1435423" cy="369332"/>
+          </a:xfrm>
+          <a:prstGeom prst="rect">
+            <a:avLst/>
+          </a:prstGeom>
+          <a:solidFill>
+            <a:srgbClr val="FFCC99">
+              <a:alpha val="30196"/>
+            </a:srgbClr>
+          </a:solidFill>
+        </p:spPr>
+        <p:txBody>
+          <a:bodyPr wrap="square" rtlCol="1">
+            <a:spAutoFit/>
+          </a:bodyPr>
+          <a:lstStyle/>
+          <a:p>
+            <a:pPr algn="l"/>
+            <a:r>
+              <a:rPr lang="en-US" dirty="0" err="1" smtClean="0"/>
+              <a:t>RAM_Full</a:t>
+            </a:r>
+            <a:r>
+              <a:rPr lang="en-US" dirty="0" smtClean="0"/>
+              <a:t>=1</a:t>
+            </a:r>
+            <a:endParaRPr lang="en-US" dirty="0" smtClean="0"/>
+          </a:p>
+        </p:txBody>
+      </p:sp>
+      <p:cxnSp>
+        <p:nvCxnSpPr>
+          <p:cNvPr id="67" name="Curved Connector 66"/>
+          <p:cNvCxnSpPr>
+            <a:stCxn id="33" idx="0"/>
+            <a:endCxn id="39" idx="4"/>
+          </p:cNvCxnSpPr>
+          <p:nvPr/>
+        </p:nvCxnSpPr>
+        <p:spPr>
+          <a:xfrm rot="5400000" flipH="1" flipV="1">
+            <a:off x="2304829" y="1029072"/>
+            <a:ext cx="3076308" cy="5013857"/>
+          </a:xfrm>
+          <a:prstGeom prst="curvedConnector3">
+            <a:avLst>
+              <a:gd name="adj1" fmla="val 35639"/>
+            </a:avLst>
+          </a:prstGeom>
+          <a:ln>
+            <a:headEnd type="none" w="med" len="med"/>
+            <a:tailEnd type="triangle" w="med" len="med"/>
+          </a:ln>
+        </p:spPr>
+        <p:style>
+          <a:lnRef idx="3">
+            <a:schemeClr val="dk1"/>
+          </a:lnRef>
+          <a:fillRef idx="0">
+            <a:schemeClr val="dk1"/>
+          </a:fillRef>
+          <a:effectRef idx="2">
+            <a:schemeClr val="dk1"/>
+          </a:effectRef>
+          <a:fontRef idx="minor">
+            <a:schemeClr val="tx1"/>
+          </a:fontRef>
+        </p:style>
+      </p:cxnSp>
+      <p:sp>
+        <p:nvSpPr>
+          <p:cNvPr id="68" name="TextBox 67"/>
+          <p:cNvSpPr txBox="1"/>
+          <p:nvPr/>
+        </p:nvSpPr>
+        <p:spPr>
+          <a:xfrm>
+            <a:off x="6141431" y="2555612"/>
+            <a:ext cx="1435423" cy="369332"/>
+          </a:xfrm>
+          <a:prstGeom prst="rect">
+            <a:avLst/>
+          </a:prstGeom>
+          <a:solidFill>
+            <a:srgbClr val="FFCC99">
+              <a:alpha val="30196"/>
+            </a:srgbClr>
+          </a:solidFill>
+        </p:spPr>
+        <p:txBody>
+          <a:bodyPr wrap="square" rtlCol="1">
+            <a:spAutoFit/>
+          </a:bodyPr>
+          <a:lstStyle/>
+          <a:p>
+            <a:pPr algn="l"/>
+            <a:r>
+              <a:rPr lang="en-US" dirty="0" err="1" smtClean="0"/>
+              <a:t>RAM_Full</a:t>
+            </a:r>
+            <a:r>
+              <a:rPr lang="en-US" dirty="0" smtClean="0"/>
+              <a:t>=0</a:t>
+            </a:r>
+            <a:endParaRPr lang="en-US" dirty="0" smtClean="0"/>
+          </a:p>
+        </p:txBody>
+      </p:sp>
+      <p:sp>
+        <p:nvSpPr>
+          <p:cNvPr id="84" name="TextBox 83"/>
+          <p:cNvSpPr txBox="1"/>
+          <p:nvPr/>
+        </p:nvSpPr>
+        <p:spPr>
+          <a:xfrm>
+            <a:off x="4142009" y="2502957"/>
+            <a:ext cx="1435423" cy="369332"/>
+          </a:xfrm>
+          <a:prstGeom prst="rect">
+            <a:avLst/>
+          </a:prstGeom>
+          <a:solidFill>
+            <a:srgbClr val="FFCC99">
+              <a:alpha val="30196"/>
+            </a:srgbClr>
+          </a:solidFill>
+        </p:spPr>
+        <p:txBody>
+          <a:bodyPr wrap="square" rtlCol="1">
+            <a:spAutoFit/>
+          </a:bodyPr>
+          <a:lstStyle/>
+          <a:p>
+            <a:pPr algn="l"/>
+            <a:r>
+              <a:rPr lang="en-US" dirty="0" err="1" smtClean="0"/>
+              <a:t>Final_Pixel</a:t>
+            </a:r>
+            <a:r>
+              <a:rPr lang="en-US" dirty="0" smtClean="0"/>
+              <a:t>=0</a:t>
+            </a:r>
+            <a:endParaRPr lang="en-US" dirty="0" smtClean="0"/>
           </a:p>
         </p:txBody>
       </p:sp>

</xml_diff>